<commit_message>
Add documentation (Close #9)
</commit_message>
<xml_diff>
--- a/CodeCraft/CodeCraft/docs/presentation/CodeCraft.pptx
+++ b/CodeCraft/CodeCraft/docs/presentation/CodeCraft.pptx
@@ -46973,8 +46973,8 @@
           <a:p>
             <a:pPr marL="0" lvl="0" indent="0"/>
             <a:r>
-              <a:rPr lang="en" dirty="0"/>
-              <a:t>Dimitur </a:t>
+              <a:rPr lang="en"/>
+              <a:t>Dimitar </a:t>
             </a:r>
             <a:r>
               <a:rPr lang="en-US" dirty="0" err="1"/>

</xml_diff>